<commit_message>
final submissions of group work
</commit_message>
<xml_diff>
--- a/Happiness vs Indicators.pptx
+++ b/Happiness vs Indicators.pptx
@@ -6,7 +6,7 @@
     <p:sldMasterId id="2147483660" r:id="rId2"/>
   </p:sldMasterIdLst>
   <p:notesMasterIdLst>
-    <p:notesMasterId r:id="rId11"/>
+    <p:notesMasterId r:id="rId12"/>
   </p:notesMasterIdLst>
   <p:sldIdLst>
     <p:sldId id="258" r:id="rId3"/>
@@ -17,6 +17,7 @@
     <p:sldId id="261" r:id="rId8"/>
     <p:sldId id="262" r:id="rId9"/>
     <p:sldId id="264" r:id="rId10"/>
+    <p:sldId id="265" r:id="rId11"/>
   </p:sldIdLst>
   <p:sldSz cx="12192000" cy="6858000"/>
   <p:notesSz cx="6858000" cy="9144000"/>
@@ -205,7 +206,7 @@
           <a:p>
             <a:fld id="{A5C20BB3-3CCB-4FE5-991B-82F6BCB48AF3}" type="datetimeFigureOut">
               <a:rPr lang="en-US" smtClean="0"/>
-              <a:t>4/12/2019</a:t>
+              <a:t>4/13/2019</a:t>
             </a:fld>
             <a:endParaRPr lang="en-US"/>
           </a:p>
@@ -930,7 +931,7 @@
             <a:fld id="{3C633830-2244-49AE-BC4A-47F415C177C6}" type="datetimeFigureOut">
               <a:rPr lang="en-US" dirty="0"/>
               <a:pPr/>
-              <a:t>4/12/2019</a:t>
+              <a:t>4/13/2019</a:t>
             </a:fld>
             <a:endParaRPr lang="en-US" dirty="0"/>
           </a:p>
@@ -1178,7 +1179,7 @@
           <a:p>
             <a:fld id="{3C633830-2244-49AE-BC4A-47F415C177C6}" type="datetimeFigureOut">
               <a:rPr lang="en-US" dirty="0"/>
-              <a:t>4/12/2019</a:t>
+              <a:t>4/13/2019</a:t>
             </a:fld>
             <a:endParaRPr lang="en-US" dirty="0"/>
           </a:p>
@@ -1564,7 +1565,7 @@
           <a:p>
             <a:fld id="{3C633830-2244-49AE-BC4A-47F415C177C6}" type="datetimeFigureOut">
               <a:rPr lang="en-US" dirty="0"/>
-              <a:t>4/12/2019</a:t>
+              <a:t>4/13/2019</a:t>
             </a:fld>
             <a:endParaRPr lang="en-US" dirty="0"/>
           </a:p>
@@ -1859,7 +1860,7 @@
           <a:p>
             <a:fld id="{3652CD92-9D15-43B4-8516-073FCDAC90D4}" type="datetimeFigureOut">
               <a:rPr lang="en-US" smtClean="0"/>
-              <a:t>4/12/2019</a:t>
+              <a:t>4/13/2019</a:t>
             </a:fld>
             <a:endParaRPr lang="en-US"/>
           </a:p>
@@ -2066,7 +2067,7 @@
           <a:p>
             <a:fld id="{3C633830-2244-49AE-BC4A-47F415C177C6}" type="datetimeFigureOut">
               <a:rPr lang="en-US" dirty="0"/>
-              <a:t>4/12/2019</a:t>
+              <a:t>4/13/2019</a:t>
             </a:fld>
             <a:endParaRPr lang="en-US" dirty="0"/>
           </a:p>
@@ -2558,7 +2559,7 @@
             <a:fld id="{3C633830-2244-49AE-BC4A-47F415C177C6}" type="datetimeFigureOut">
               <a:rPr lang="en-US" dirty="0"/>
               <a:pPr/>
-              <a:t>4/12/2019</a:t>
+              <a:t>4/13/2019</a:t>
             </a:fld>
             <a:endParaRPr lang="en-US" dirty="0"/>
           </a:p>
@@ -2869,7 +2870,7 @@
           <a:p>
             <a:fld id="{3C633830-2244-49AE-BC4A-47F415C177C6}" type="datetimeFigureOut">
               <a:rPr lang="en-US" dirty="0"/>
-              <a:t>4/12/2019</a:t>
+              <a:t>4/13/2019</a:t>
             </a:fld>
             <a:endParaRPr lang="en-US" dirty="0"/>
           </a:p>
@@ -3260,7 +3261,7 @@
           <a:p>
             <a:fld id="{3C633830-2244-49AE-BC4A-47F415C177C6}" type="datetimeFigureOut">
               <a:rPr lang="en-US" dirty="0"/>
-              <a:t>4/12/2019</a:t>
+              <a:t>4/13/2019</a:t>
             </a:fld>
             <a:endParaRPr lang="en-US" dirty="0"/>
           </a:p>
@@ -3378,7 +3379,7 @@
           <a:p>
             <a:fld id="{3C633830-2244-49AE-BC4A-47F415C177C6}" type="datetimeFigureOut">
               <a:rPr lang="en-US" dirty="0"/>
-              <a:t>4/12/2019</a:t>
+              <a:t>4/13/2019</a:t>
             </a:fld>
             <a:endParaRPr lang="en-US" dirty="0"/>
           </a:p>
@@ -3473,7 +3474,7 @@
           <a:p>
             <a:fld id="{3C633830-2244-49AE-BC4A-47F415C177C6}" type="datetimeFigureOut">
               <a:rPr lang="en-US" dirty="0"/>
-              <a:t>4/12/2019</a:t>
+              <a:t>4/13/2019</a:t>
             </a:fld>
             <a:endParaRPr lang="en-US" dirty="0"/>
           </a:p>
@@ -3773,7 +3774,7 @@
           <a:p>
             <a:fld id="{3C633830-2244-49AE-BC4A-47F415C177C6}" type="datetimeFigureOut">
               <a:rPr lang="en-US" dirty="0"/>
-              <a:t>4/12/2019</a:t>
+              <a:t>4/13/2019</a:t>
             </a:fld>
             <a:endParaRPr lang="en-US" dirty="0"/>
           </a:p>
@@ -4038,7 +4039,7 @@
           <a:p>
             <a:fld id="{3C633830-2244-49AE-BC4A-47F415C177C6}" type="datetimeFigureOut">
               <a:rPr lang="en-US" dirty="0"/>
-              <a:t>4/12/2019</a:t>
+              <a:t>4/13/2019</a:t>
             </a:fld>
             <a:endParaRPr lang="en-US" dirty="0"/>
           </a:p>
@@ -4457,7 +4458,7 @@
             <a:fld id="{3C633830-2244-49AE-BC4A-47F415C177C6}" type="datetimeFigureOut">
               <a:rPr lang="en-US" dirty="0"/>
               <a:pPr/>
-              <a:t>4/12/2019</a:t>
+              <a:t>4/13/2019</a:t>
             </a:fld>
             <a:endParaRPr lang="en-US" dirty="0"/>
           </a:p>
@@ -5096,7 +5097,7 @@
           <a:p>
             <a:fld id="{3652CD92-9D15-43B4-8516-073FCDAC90D4}" type="datetimeFigureOut">
               <a:rPr lang="en-US" smtClean="0"/>
-              <a:t>4/12/2019</a:t>
+              <a:t>4/13/2019</a:t>
             </a:fld>
             <a:endParaRPr lang="en-US"/>
           </a:p>
@@ -5682,8 +5683,8 @@
           <a:p>
             <a:pPr algn="r"/>
             <a:r>
-              <a:rPr lang="en-US" sz="4400"/>
-              <a:t>Data analysis</a:t>
+              <a:rPr lang="en-US" sz="4400" dirty="0"/>
+              <a:t>Happiness vs indicators</a:t>
             </a:r>
           </a:p>
         </p:txBody>
@@ -5712,7 +5713,38 @@
           <a:p>
             <a:r>
               <a:rPr lang="en-US" sz="2800" dirty="0"/>
-              <a:t>Happiness vs Indicators</a:t>
+              <a:t>Group: Fab 5</a:t>
+            </a:r>
+          </a:p>
+          <a:p>
+            <a:r>
+              <a:rPr lang="en-US" sz="2800" dirty="0"/>
+              <a:t>Seth</a:t>
+            </a:r>
+          </a:p>
+          <a:p>
+            <a:r>
+              <a:rPr lang="en-US" sz="2800" dirty="0"/>
+              <a:t>Ryan</a:t>
+            </a:r>
+          </a:p>
+          <a:p>
+            <a:r>
+              <a:rPr lang="en-US" sz="2800" dirty="0"/>
+              <a:t>Mona</a:t>
+            </a:r>
+          </a:p>
+          <a:p>
+            <a:r>
+              <a:rPr lang="en-US" sz="2800" dirty="0" err="1"/>
+              <a:t>Mendie</a:t>
+            </a:r>
+            <a:endParaRPr lang="en-US" sz="2800" dirty="0"/>
+          </a:p>
+          <a:p>
+            <a:r>
+              <a:rPr lang="en-US" sz="2800" dirty="0"/>
+              <a:t>Dawn</a:t>
             </a:r>
             <a:endParaRPr sz="2800" dirty="0"/>
           </a:p>
@@ -6050,46 +6082,6 @@
       </p:sp>
       <p:sp>
         <p:nvSpPr>
-          <p:cNvPr id="20" name="Text 2"/>
-          <p:cNvSpPr/>
-          <p:nvPr/>
-        </p:nvSpPr>
-        <p:spPr>
-          <a:xfrm>
-            <a:off x="838200" y="1461299"/>
-            <a:ext cx="10462846" cy="415498"/>
-          </a:xfrm>
-          <a:prstGeom prst="rect">
-            <a:avLst/>
-          </a:prstGeom>
-        </p:spPr>
-        <p:txBody>
-          <a:bodyPr wrap="square">
-            <a:spAutoFit/>
-          </a:bodyPr>
-          <a:lstStyle/>
-          <a:p>
-            <a:pPr>
-              <a:lnSpc>
-                <a:spcPct val="150000"/>
-              </a:lnSpc>
-            </a:pPr>
-            <a:r>
-              <a:rPr lang="en-US" sz="1400" dirty="0">
-                <a:solidFill>
-                  <a:srgbClr val="D24726"/>
-                </a:solidFill>
-                <a:latin typeface="Segoe UI Semibold" panose="020B0702040204020203" pitchFamily="34" charset="0"/>
-                <a:ea typeface="Segoe UI Semibold" panose="020B0702040204020203" pitchFamily="34" charset="0"/>
-                <a:cs typeface="Segoe UI" panose="020B0502040204020203" pitchFamily="34" charset="0"/>
-              </a:rPr>
-              <a:t>Key facts about your topic</a:t>
-            </a:r>
-          </a:p>
-        </p:txBody>
-      </p:sp>
-      <p:sp>
-        <p:nvSpPr>
           <p:cNvPr id="21" name="Content Placeholder 2"/>
           <p:cNvSpPr txBox="1">
             <a:spLocks/>
@@ -6136,7 +6128,137 @@
                 <a:ea typeface="Segoe UI" panose="020B0502040204020203" pitchFamily="34" charset="0"/>
                 <a:cs typeface="Segoe UI Semilight" panose="020B0402040204020203" pitchFamily="34" charset="0"/>
               </a:rPr>
-              <a:t>Is there a correlation between happiness and indicators (Infant mortality %, Literacy %, GDP per capita, )?</a:t>
+              <a:t>Is there a correlation between happiness and the following indicators:</a:t>
+            </a:r>
+          </a:p>
+          <a:p>
+            <a:pPr marL="0" indent="0">
+              <a:lnSpc>
+                <a:spcPct val="150000"/>
+              </a:lnSpc>
+              <a:spcBef>
+                <a:spcPts val="0"/>
+              </a:spcBef>
+              <a:buFont typeface="Arial" panose="020B0604020202020204" pitchFamily="34" charset="0"/>
+              <a:buNone/>
+            </a:pPr>
+            <a:r>
+              <a:rPr lang="en-US" sz="1400" dirty="0">
+                <a:solidFill>
+                  <a:schemeClr val="tx1">
+                    <a:lumMod val="65000"/>
+                    <a:lumOff val="35000"/>
+                  </a:schemeClr>
+                </a:solidFill>
+                <a:latin typeface="Segoe UI Semilight" panose="020B0402040204020203" pitchFamily="34" charset="0"/>
+                <a:ea typeface="Segoe UI" panose="020B0502040204020203" pitchFamily="34" charset="0"/>
+                <a:cs typeface="Segoe UI Semilight" panose="020B0402040204020203" pitchFamily="34" charset="0"/>
+              </a:rPr>
+              <a:t>	Infant mortality %,</a:t>
+            </a:r>
+          </a:p>
+          <a:p>
+            <a:pPr marL="0" indent="0">
+              <a:lnSpc>
+                <a:spcPct val="150000"/>
+              </a:lnSpc>
+              <a:spcBef>
+                <a:spcPts val="0"/>
+              </a:spcBef>
+              <a:buFont typeface="Arial" panose="020B0604020202020204" pitchFamily="34" charset="0"/>
+              <a:buNone/>
+            </a:pPr>
+            <a:r>
+              <a:rPr lang="en-US" sz="1400" dirty="0">
+                <a:solidFill>
+                  <a:schemeClr val="tx1">
+                    <a:lumMod val="65000"/>
+                    <a:lumOff val="35000"/>
+                  </a:schemeClr>
+                </a:solidFill>
+                <a:latin typeface="Segoe UI Semilight" panose="020B0402040204020203" pitchFamily="34" charset="0"/>
+                <a:ea typeface="Segoe UI" panose="020B0502040204020203" pitchFamily="34" charset="0"/>
+                <a:cs typeface="Segoe UI Semilight" panose="020B0402040204020203" pitchFamily="34" charset="0"/>
+              </a:rPr>
+              <a:t>	Literacy %</a:t>
+            </a:r>
+          </a:p>
+          <a:p>
+            <a:pPr marL="0" indent="0">
+              <a:lnSpc>
+                <a:spcPct val="150000"/>
+              </a:lnSpc>
+              <a:spcBef>
+                <a:spcPts val="0"/>
+              </a:spcBef>
+              <a:buFont typeface="Arial" panose="020B0604020202020204" pitchFamily="34" charset="0"/>
+              <a:buNone/>
+            </a:pPr>
+            <a:r>
+              <a:rPr lang="en-US" sz="1400" dirty="0">
+                <a:solidFill>
+                  <a:schemeClr val="tx1">
+                    <a:lumMod val="65000"/>
+                    <a:lumOff val="35000"/>
+                  </a:schemeClr>
+                </a:solidFill>
+                <a:latin typeface="Segoe UI Semilight" panose="020B0402040204020203" pitchFamily="34" charset="0"/>
+                <a:ea typeface="Segoe UI" panose="020B0502040204020203" pitchFamily="34" charset="0"/>
+                <a:cs typeface="Segoe UI Semilight" panose="020B0402040204020203" pitchFamily="34" charset="0"/>
+              </a:rPr>
+              <a:t>	GDP per capita</a:t>
+            </a:r>
+          </a:p>
+          <a:p>
+            <a:pPr marL="0" indent="0">
+              <a:lnSpc>
+                <a:spcPct val="150000"/>
+              </a:lnSpc>
+              <a:spcBef>
+                <a:spcPts val="0"/>
+              </a:spcBef>
+              <a:buFont typeface="Arial" panose="020B0604020202020204" pitchFamily="34" charset="0"/>
+              <a:buNone/>
+            </a:pPr>
+            <a:r>
+              <a:rPr lang="en-US" sz="1400" dirty="0">
+                <a:solidFill>
+                  <a:schemeClr val="tx1">
+                    <a:lumMod val="65000"/>
+                    <a:lumOff val="35000"/>
+                  </a:schemeClr>
+                </a:solidFill>
+                <a:latin typeface="Segoe UI Semilight" panose="020B0402040204020203" pitchFamily="34" charset="0"/>
+                <a:ea typeface="Segoe UI" panose="020B0502040204020203" pitchFamily="34" charset="0"/>
+                <a:cs typeface="Segoe UI Semilight" panose="020B0402040204020203" pitchFamily="34" charset="0"/>
+              </a:rPr>
+              <a:t>	Freedom</a:t>
+            </a:r>
+          </a:p>
+          <a:p>
+            <a:pPr marL="0" indent="0">
+              <a:lnSpc>
+                <a:spcPct val="150000"/>
+              </a:lnSpc>
+              <a:spcBef>
+                <a:spcPts val="0"/>
+              </a:spcBef>
+              <a:buFont typeface="Arial" panose="020B0604020202020204" pitchFamily="34" charset="0"/>
+              <a:buNone/>
+            </a:pPr>
+            <a:r>
+              <a:rPr lang="en-US" sz="1400" dirty="0">
+                <a:solidFill>
+                  <a:schemeClr val="tx1">
+                    <a:lumMod val="65000"/>
+                    <a:lumOff val="35000"/>
+                  </a:schemeClr>
+                </a:solidFill>
+                <a:latin typeface="Segoe UI Semilight" panose="020B0402040204020203" pitchFamily="34" charset="0"/>
+                <a:ea typeface="Segoe UI" panose="020B0502040204020203" pitchFamily="34" charset="0"/>
+                <a:cs typeface="Segoe UI Semilight" panose="020B0402040204020203" pitchFamily="34" charset="0"/>
+              </a:rPr>
+              <a:t>	Life expectancy </a:t>
             </a:r>
           </a:p>
           <a:p>
@@ -6185,7 +6307,59 @@
                 <a:ea typeface="Segoe UI" panose="020B0502040204020203" pitchFamily="34" charset="0"/>
                 <a:cs typeface="Segoe UI Semilight" panose="020B0402040204020203" pitchFamily="34" charset="0"/>
               </a:rPr>
-              <a:t>Our goal is to determine if happiness is determined in part by several indicators of data gathered in the study.</a:t>
+              <a:t>Our goal is to determine if happiness is determined in part by several indicators of data gathered in the study. In other words, what makes people happy? </a:t>
+            </a:r>
+          </a:p>
+          <a:p>
+            <a:pPr marL="0" indent="0">
+              <a:lnSpc>
+                <a:spcPct val="150000"/>
+              </a:lnSpc>
+              <a:spcBef>
+                <a:spcPts val="0"/>
+              </a:spcBef>
+              <a:buFont typeface="Arial" panose="020B0604020202020204" pitchFamily="34" charset="0"/>
+              <a:buNone/>
+            </a:pPr>
+            <a:r>
+              <a:rPr lang="en-US" sz="1400" dirty="0">
+                <a:solidFill>
+                  <a:schemeClr val="tx1">
+                    <a:lumMod val="65000"/>
+                    <a:lumOff val="35000"/>
+                  </a:schemeClr>
+                </a:solidFill>
+                <a:latin typeface="Segoe UI Semilight" panose="020B0402040204020203" pitchFamily="34" charset="0"/>
+                <a:ea typeface="Segoe UI" panose="020B0502040204020203" pitchFamily="34" charset="0"/>
+                <a:cs typeface="Segoe UI Semilight" panose="020B0402040204020203" pitchFamily="34" charset="0"/>
+              </a:rPr>
+              <a:t>We used data from the World Happiness Report as well as  </a:t>
+            </a:r>
+          </a:p>
+          <a:p>
+            <a:pPr marL="0" indent="0">
+              <a:lnSpc>
+                <a:spcPct val="150000"/>
+              </a:lnSpc>
+              <a:spcBef>
+                <a:spcPts val="0"/>
+              </a:spcBef>
+              <a:buFont typeface="Arial" panose="020B0604020202020204" pitchFamily="34" charset="0"/>
+              <a:buNone/>
+            </a:pPr>
+            <a:r>
+              <a:rPr lang="en-US" sz="1400" dirty="0">
+                <a:solidFill>
+                  <a:schemeClr val="tx1">
+                    <a:lumMod val="65000"/>
+                    <a:lumOff val="35000"/>
+                  </a:schemeClr>
+                </a:solidFill>
+                <a:latin typeface="Segoe UI Semilight" panose="020B0402040204020203" pitchFamily="34" charset="0"/>
+                <a:ea typeface="Segoe UI" panose="020B0502040204020203" pitchFamily="34" charset="0"/>
+                <a:cs typeface="Segoe UI Semilight" panose="020B0402040204020203" pitchFamily="34" charset="0"/>
+              </a:rPr>
+              <a:t>We found that GDP per capita was a strong indicator of overall happiness of a given country, while infant mortality and literacy showed no correlation to overall happiness.</a:t>
             </a:r>
           </a:p>
         </p:txBody>
@@ -6506,7 +6680,7 @@
             </a:br>
             <a:r>
               <a:rPr lang="en-US" dirty="0"/>
-              <a:t>Used:</a:t>
+              <a:t>Used and Questions Asked</a:t>
             </a:r>
           </a:p>
         </p:txBody>
@@ -6529,13 +6703,64 @@
         </p:nvSpPr>
         <p:spPr/>
         <p:txBody>
-          <a:bodyPr/>
+          <a:bodyPr>
+            <a:normAutofit lnSpcReduction="10000"/>
+          </a:bodyPr>
           <a:lstStyle/>
           <a:p>
+            <a:pPr marL="0" indent="0">
+              <a:buNone/>
+            </a:pPr>
+            <a:r>
+              <a:rPr lang="en-US" sz="2800" dirty="0"/>
+              <a:t>Datasets:</a:t>
+            </a:r>
+          </a:p>
+          <a:p>
+            <a:pPr>
+              <a:buFontTx/>
+              <a:buChar char="-"/>
+            </a:pPr>
             <a:r>
               <a:rPr lang="en-US" dirty="0"/>
-              <a:t>World Bank API</a:t>
-            </a:r>
+              <a:t>World Happiness Report</a:t>
+            </a:r>
+          </a:p>
+          <a:p>
+            <a:pPr lvl="1">
+              <a:buFontTx/>
+              <a:buChar char="-"/>
+            </a:pPr>
+            <a:r>
+              <a:rPr lang="en-US" dirty="0"/>
+              <a:t>Happiness score, GDP per capita, Life expectancy, and Freedom by Country.</a:t>
+            </a:r>
+          </a:p>
+          <a:p>
+            <a:pPr>
+              <a:buFontTx/>
+              <a:buChar char="-"/>
+            </a:pPr>
+            <a:r>
+              <a:rPr lang="en-US" dirty="0"/>
+              <a:t>World Bank</a:t>
+            </a:r>
+          </a:p>
+          <a:p>
+            <a:pPr marL="0" indent="0">
+              <a:buNone/>
+            </a:pPr>
+            <a:r>
+              <a:rPr lang="en-US" dirty="0"/>
+              <a:t>        -    Infant mortality and Literacy % by Country</a:t>
+            </a:r>
+          </a:p>
+          <a:p>
+            <a:pPr>
+              <a:buFontTx/>
+              <a:buChar char="-"/>
+            </a:pPr>
+            <a:endParaRPr lang="en-US" dirty="0"/>
           </a:p>
         </p:txBody>
       </p:sp>
@@ -6557,13 +6782,45 @@
         </p:nvSpPr>
         <p:spPr/>
         <p:txBody>
-          <a:bodyPr/>
+          <a:bodyPr>
+            <a:normAutofit lnSpcReduction="10000"/>
+          </a:bodyPr>
           <a:lstStyle/>
           <a:p>
+            <a:pPr marL="0" indent="0">
+              <a:buNone/>
+            </a:pPr>
             <a:r>
               <a:rPr lang="en-US" dirty="0"/>
-              <a:t>World Happiness Report</a:t>
-            </a:r>
+              <a:t>Questions asked:</a:t>
+            </a:r>
+          </a:p>
+          <a:p>
+            <a:pPr>
+              <a:buFontTx/>
+              <a:buChar char="-"/>
+            </a:pPr>
+            <a:r>
+              <a:rPr lang="en-US" dirty="0"/>
+              <a:t>Do infant mortality, literacy %,GDP per capita, freedom, and life expectancy correlate with happiness?</a:t>
+            </a:r>
+          </a:p>
+          <a:p>
+            <a:pPr>
+              <a:buFontTx/>
+              <a:buChar char="-"/>
+            </a:pPr>
+            <a:r>
+              <a:rPr lang="en-US" dirty="0"/>
+              <a:t>Which indicator influences happiness the greatest?</a:t>
+            </a:r>
+          </a:p>
+          <a:p>
+            <a:pPr>
+              <a:buFontTx/>
+              <a:buChar char="-"/>
+            </a:pPr>
+            <a:endParaRPr lang="en-US" dirty="0"/>
           </a:p>
         </p:txBody>
       </p:sp>
@@ -8578,7 +8835,7 @@
           <a:p>
             <a:r>
               <a:rPr lang="en-US" dirty="0"/>
-              <a:t>Conclusions</a:t>
+              <a:t>Discussion</a:t>
             </a:r>
           </a:p>
         </p:txBody>
@@ -8641,6 +8898,89 @@
     <p:extLst>
       <p:ext uri="{BB962C8B-B14F-4D97-AF65-F5344CB8AC3E}">
         <p14:creationId xmlns:p14="http://schemas.microsoft.com/office/powerpoint/2010/main" val="2114449181"/>
+      </p:ext>
+    </p:extLst>
+  </p:cSld>
+  <p:clrMapOvr>
+    <a:masterClrMapping/>
+  </p:clrMapOvr>
+</p:sld>
+</file>
+
+<file path=ppt/slides/slide9.xml><?xml version="1.0" encoding="utf-8"?>
+<p:sld xmlns:a="http://schemas.openxmlformats.org/drawingml/2006/main" xmlns:r="http://schemas.openxmlformats.org/officeDocument/2006/relationships" xmlns:p="http://schemas.openxmlformats.org/presentationml/2006/main">
+  <p:cSld>
+    <p:spTree>
+      <p:nvGrpSpPr>
+        <p:cNvPr id="1" name=""/>
+        <p:cNvGrpSpPr/>
+        <p:nvPr/>
+      </p:nvGrpSpPr>
+      <p:grpSpPr>
+        <a:xfrm>
+          <a:off x="0" y="0"/>
+          <a:ext cx="0" cy="0"/>
+          <a:chOff x="0" y="0"/>
+          <a:chExt cx="0" cy="0"/>
+        </a:xfrm>
+      </p:grpSpPr>
+      <p:sp>
+        <p:nvSpPr>
+          <p:cNvPr id="2" name="Title 1">
+            <a:extLst>
+              <a:ext uri="{FF2B5EF4-FFF2-40B4-BE49-F238E27FC236}">
+                <a16:creationId xmlns:a16="http://schemas.microsoft.com/office/drawing/2014/main" id="{F1F731C6-3C24-4E44-B271-21F11DD89F80}"/>
+              </a:ext>
+            </a:extLst>
+          </p:cNvPr>
+          <p:cNvSpPr>
+            <a:spLocks noGrp="1"/>
+          </p:cNvSpPr>
+          <p:nvPr>
+            <p:ph type="title"/>
+          </p:nvPr>
+        </p:nvSpPr>
+        <p:spPr/>
+        <p:txBody>
+          <a:bodyPr/>
+          <a:lstStyle/>
+          <a:p>
+            <a:r>
+              <a:rPr lang="en-US" dirty="0"/>
+              <a:t>Post Mortem</a:t>
+            </a:r>
+          </a:p>
+        </p:txBody>
+      </p:sp>
+      <p:sp>
+        <p:nvSpPr>
+          <p:cNvPr id="3" name="Content Placeholder 2">
+            <a:extLst>
+              <a:ext uri="{FF2B5EF4-FFF2-40B4-BE49-F238E27FC236}">
+                <a16:creationId xmlns:a16="http://schemas.microsoft.com/office/drawing/2014/main" id="{A75410F1-E193-4C27-BF86-3145F63059B2}"/>
+              </a:ext>
+            </a:extLst>
+          </p:cNvPr>
+          <p:cNvSpPr>
+            <a:spLocks noGrp="1"/>
+          </p:cNvSpPr>
+          <p:nvPr>
+            <p:ph idx="1"/>
+          </p:nvPr>
+        </p:nvSpPr>
+        <p:spPr/>
+        <p:txBody>
+          <a:bodyPr/>
+          <a:lstStyle/>
+          <a:p>
+            <a:endParaRPr lang="en-US" dirty="0"/>
+          </a:p>
+        </p:txBody>
+      </p:sp>
+    </p:spTree>
+    <p:extLst>
+      <p:ext uri="{BB962C8B-B14F-4D97-AF65-F5344CB8AC3E}">
+        <p14:creationId xmlns:p14="http://schemas.microsoft.com/office/powerpoint/2010/main" val="3854966804"/>
       </p:ext>
     </p:extLst>
   </p:cSld>

</xml_diff>